<commit_message>
Annexe 8 arbre à la déicsions
</commit_message>
<xml_diff>
--- a/client/public/fichiers/ANNEXE 8 - ARBRE A LA DECISION SUR LES CARACTERISTIQUES DU PORTEUR DE PROJET.pptx
+++ b/client/public/fichiers/ANNEXE 8 - ARBRE A LA DECISION SUR LES CARACTERISTIQUES DU PORTEUR DE PROJET.pptx
@@ -147,7 +147,7 @@
 <file path=ppt/revisionInfo.xml><?xml version="1.0" encoding="utf-8"?>
 <p1510:revInfo xmlns:a="http://schemas.openxmlformats.org/drawingml/2006/main" xmlns:r="http://schemas.openxmlformats.org/officeDocument/2006/relationships" xmlns:p1510="http://schemas.microsoft.com/office/powerpoint/2015/10/main">
   <p1510:revLst>
-    <p1510:client id="{DDB080E2-2F19-07BF-4774-7E4FA0117116}" v="4" dt="2025-08-19T17:55:34.716"/>
+    <p1510:client id="{CC5B81FC-BCF0-4DCC-9F3E-E0AB1D8A7B60}" v="1" dt="2025-08-22T15:15:35.630"/>
   </p1510:revLst>
 </p1510:revInfo>
 </file>
@@ -157,12 +157,12 @@
   <pc:docChgLst>
     <pc:chgData name="Laura GOMBAUD" userId="95dfd7b3-193d-40a4-ae58-03a5f77a8c61" providerId="ADAL" clId="{CC5B81FC-BCF0-4DCC-9F3E-E0AB1D8A7B60}"/>
     <pc:docChg chg="undo custSel addSld delSld modSld sldOrd">
-      <pc:chgData name="Laura GOMBAUD" userId="95dfd7b3-193d-40a4-ae58-03a5f77a8c61" providerId="ADAL" clId="{CC5B81FC-BCF0-4DCC-9F3E-E0AB1D8A7B60}" dt="2025-08-02T16:08:21.073" v="865" actId="20577"/>
+      <pc:chgData name="Laura GOMBAUD" userId="95dfd7b3-193d-40a4-ae58-03a5f77a8c61" providerId="ADAL" clId="{CC5B81FC-BCF0-4DCC-9F3E-E0AB1D8A7B60}" dt="2025-08-22T15:19:32.548" v="903" actId="108"/>
       <pc:docMkLst>
         <pc:docMk/>
       </pc:docMkLst>
       <pc:sldChg chg="addSp delSp modSp mod ord">
-        <pc:chgData name="Laura GOMBAUD" userId="95dfd7b3-193d-40a4-ae58-03a5f77a8c61" providerId="ADAL" clId="{CC5B81FC-BCF0-4DCC-9F3E-E0AB1D8A7B60}" dt="2025-08-02T16:07:40.118" v="859" actId="20577"/>
+        <pc:chgData name="Laura GOMBAUD" userId="95dfd7b3-193d-40a4-ae58-03a5f77a8c61" providerId="ADAL" clId="{CC5B81FC-BCF0-4DCC-9F3E-E0AB1D8A7B60}" dt="2025-08-22T15:18:22.748" v="880" actId="1076"/>
         <pc:sldMkLst>
           <pc:docMk/>
           <pc:sldMk cId="193143965" sldId="298"/>
@@ -184,7 +184,7 @@
           </ac:spMkLst>
         </pc:spChg>
         <pc:spChg chg="mod">
-          <ac:chgData name="Laura GOMBAUD" userId="95dfd7b3-193d-40a4-ae58-03a5f77a8c61" providerId="ADAL" clId="{CC5B81FC-BCF0-4DCC-9F3E-E0AB1D8A7B60}" dt="2025-08-02T15:14:03.600" v="204" actId="2711"/>
+          <ac:chgData name="Laura GOMBAUD" userId="95dfd7b3-193d-40a4-ae58-03a5f77a8c61" providerId="ADAL" clId="{CC5B81FC-BCF0-4DCC-9F3E-E0AB1D8A7B60}" dt="2025-08-22T15:18:22.748" v="880" actId="1076"/>
           <ac:spMkLst>
             <pc:docMk/>
             <pc:sldMk cId="193143965" sldId="298"/>
@@ -208,7 +208,7 @@
         </pc:sldMkLst>
       </pc:sldChg>
       <pc:sldChg chg="addSp delSp modSp mod">
-        <pc:chgData name="Laura GOMBAUD" userId="95dfd7b3-193d-40a4-ae58-03a5f77a8c61" providerId="ADAL" clId="{CC5B81FC-BCF0-4DCC-9F3E-E0AB1D8A7B60}" dt="2025-08-02T16:07:33.766" v="856" actId="20577"/>
+        <pc:chgData name="Laura GOMBAUD" userId="95dfd7b3-193d-40a4-ae58-03a5f77a8c61" providerId="ADAL" clId="{CC5B81FC-BCF0-4DCC-9F3E-E0AB1D8A7B60}" dt="2025-08-22T15:18:45.057" v="881" actId="108"/>
         <pc:sldMkLst>
           <pc:docMk/>
           <pc:sldMk cId="4034650231" sldId="302"/>
@@ -230,7 +230,7 @@
           </ac:spMkLst>
         </pc:spChg>
         <pc:spChg chg="mod">
-          <ac:chgData name="Laura GOMBAUD" userId="95dfd7b3-193d-40a4-ae58-03a5f77a8c61" providerId="ADAL" clId="{CC5B81FC-BCF0-4DCC-9F3E-E0AB1D8A7B60}" dt="2025-08-02T15:13:56.444" v="203" actId="2711"/>
+          <ac:chgData name="Laura GOMBAUD" userId="95dfd7b3-193d-40a4-ae58-03a5f77a8c61" providerId="ADAL" clId="{CC5B81FC-BCF0-4DCC-9F3E-E0AB1D8A7B60}" dt="2025-08-22T15:18:45.057" v="881" actId="108"/>
           <ac:spMkLst>
             <pc:docMk/>
             <pc:sldMk cId="4034650231" sldId="302"/>
@@ -268,7 +268,7 @@
         </pc:sldMkLst>
       </pc:sldChg>
       <pc:sldChg chg="addSp delSp modSp add mod modAnim">
-        <pc:chgData name="Laura GOMBAUD" userId="95dfd7b3-193d-40a4-ae58-03a5f77a8c61" providerId="ADAL" clId="{CC5B81FC-BCF0-4DCC-9F3E-E0AB1D8A7B60}" dt="2025-08-02T16:00:07.552" v="795" actId="12788"/>
+        <pc:chgData name="Laura GOMBAUD" userId="95dfd7b3-193d-40a4-ae58-03a5f77a8c61" providerId="ADAL" clId="{CC5B81FC-BCF0-4DCC-9F3E-E0AB1D8A7B60}" dt="2025-08-22T15:18:47.400" v="882" actId="108"/>
         <pc:sldMkLst>
           <pc:docMk/>
           <pc:sldMk cId="1566335460" sldId="305"/>
@@ -338,7 +338,7 @@
           </ac:spMkLst>
         </pc:spChg>
         <pc:spChg chg="mod">
-          <ac:chgData name="Laura GOMBAUD" userId="95dfd7b3-193d-40a4-ae58-03a5f77a8c61" providerId="ADAL" clId="{CC5B81FC-BCF0-4DCC-9F3E-E0AB1D8A7B60}" dt="2025-08-02T15:13:46.923" v="201" actId="2711"/>
+          <ac:chgData name="Laura GOMBAUD" userId="95dfd7b3-193d-40a4-ae58-03a5f77a8c61" providerId="ADAL" clId="{CC5B81FC-BCF0-4DCC-9F3E-E0AB1D8A7B60}" dt="2025-08-22T15:18:47.400" v="882" actId="108"/>
           <ac:spMkLst>
             <pc:docMk/>
             <pc:sldMk cId="1566335460" sldId="305"/>
@@ -361,7 +361,7 @@
         </pc:sldMkLst>
       </pc:sldChg>
       <pc:sldChg chg="addSp modSp add mod modAnim">
-        <pc:chgData name="Laura GOMBAUD" userId="95dfd7b3-193d-40a4-ae58-03a5f77a8c61" providerId="ADAL" clId="{CC5B81FC-BCF0-4DCC-9F3E-E0AB1D8A7B60}" dt="2025-08-02T15:56:15.900" v="773" actId="1076"/>
+        <pc:chgData name="Laura GOMBAUD" userId="95dfd7b3-193d-40a4-ae58-03a5f77a8c61" providerId="ADAL" clId="{CC5B81FC-BCF0-4DCC-9F3E-E0AB1D8A7B60}" dt="2025-08-22T15:18:52.346" v="884" actId="108"/>
         <pc:sldMkLst>
           <pc:docMk/>
           <pc:sldMk cId="850087606" sldId="307"/>
@@ -406,9 +406,17 @@
             <ac:spMk id="9" creationId="{FAEA8813-7AFC-C184-83F1-C2AA11CF065A}"/>
           </ac:spMkLst>
         </pc:spChg>
+        <pc:spChg chg="mod">
+          <ac:chgData name="Laura GOMBAUD" userId="95dfd7b3-193d-40a4-ae58-03a5f77a8c61" providerId="ADAL" clId="{CC5B81FC-BCF0-4DCC-9F3E-E0AB1D8A7B60}" dt="2025-08-22T15:18:52.346" v="884" actId="108"/>
+          <ac:spMkLst>
+            <pc:docMk/>
+            <pc:sldMk cId="850087606" sldId="307"/>
+            <ac:spMk id="10" creationId="{A1F77CE7-8075-8030-676D-0533FC7C617C}"/>
+          </ac:spMkLst>
+        </pc:spChg>
       </pc:sldChg>
       <pc:sldChg chg="modSp add mod">
-        <pc:chgData name="Laura GOMBAUD" userId="95dfd7b3-193d-40a4-ae58-03a5f77a8c61" providerId="ADAL" clId="{CC5B81FC-BCF0-4DCC-9F3E-E0AB1D8A7B60}" dt="2025-08-02T15:57:04.522" v="776" actId="1076"/>
+        <pc:chgData name="Laura GOMBAUD" userId="95dfd7b3-193d-40a4-ae58-03a5f77a8c61" providerId="ADAL" clId="{CC5B81FC-BCF0-4DCC-9F3E-E0AB1D8A7B60}" dt="2025-08-22T15:18:56.012" v="885" actId="108"/>
         <pc:sldMkLst>
           <pc:docMk/>
           <pc:sldMk cId="997985961" sldId="308"/>
@@ -453,9 +461,17 @@
             <ac:spMk id="9" creationId="{B7C81489-2055-7F7C-0271-0DC4102DEA93}"/>
           </ac:spMkLst>
         </pc:spChg>
+        <pc:spChg chg="mod">
+          <ac:chgData name="Laura GOMBAUD" userId="95dfd7b3-193d-40a4-ae58-03a5f77a8c61" providerId="ADAL" clId="{CC5B81FC-BCF0-4DCC-9F3E-E0AB1D8A7B60}" dt="2025-08-22T15:18:56.012" v="885" actId="108"/>
+          <ac:spMkLst>
+            <pc:docMk/>
+            <pc:sldMk cId="997985961" sldId="308"/>
+            <ac:spMk id="10" creationId="{372F5E66-716A-2E91-26D5-AA0DA4A99BBB}"/>
+          </ac:spMkLst>
+        </pc:spChg>
       </pc:sldChg>
       <pc:sldChg chg="modSp add mod">
-        <pc:chgData name="Laura GOMBAUD" userId="95dfd7b3-193d-40a4-ae58-03a5f77a8c61" providerId="ADAL" clId="{CC5B81FC-BCF0-4DCC-9F3E-E0AB1D8A7B60}" dt="2025-08-02T15:48:44.869" v="722" actId="1076"/>
+        <pc:chgData name="Laura GOMBAUD" userId="95dfd7b3-193d-40a4-ae58-03a5f77a8c61" providerId="ADAL" clId="{CC5B81FC-BCF0-4DCC-9F3E-E0AB1D8A7B60}" dt="2025-08-22T15:18:58.599" v="886" actId="108"/>
         <pc:sldMkLst>
           <pc:docMk/>
           <pc:sldMk cId="2859370614" sldId="309"/>
@@ -500,9 +516,17 @@
             <ac:spMk id="9" creationId="{03D118DC-C1F7-EDF2-FB93-AFC605BAE45B}"/>
           </ac:spMkLst>
         </pc:spChg>
+        <pc:spChg chg="mod">
+          <ac:chgData name="Laura GOMBAUD" userId="95dfd7b3-193d-40a4-ae58-03a5f77a8c61" providerId="ADAL" clId="{CC5B81FC-BCF0-4DCC-9F3E-E0AB1D8A7B60}" dt="2025-08-22T15:18:58.599" v="886" actId="108"/>
+          <ac:spMkLst>
+            <pc:docMk/>
+            <pc:sldMk cId="2859370614" sldId="309"/>
+            <ac:spMk id="10" creationId="{F7098E1F-A76B-3295-C273-04BF71151FD2}"/>
+          </ac:spMkLst>
+        </pc:spChg>
       </pc:sldChg>
       <pc:sldChg chg="modSp add mod">
-        <pc:chgData name="Laura GOMBAUD" userId="95dfd7b3-193d-40a4-ae58-03a5f77a8c61" providerId="ADAL" clId="{CC5B81FC-BCF0-4DCC-9F3E-E0AB1D8A7B60}" dt="2025-08-02T15:57:35.053" v="778" actId="1076"/>
+        <pc:chgData name="Laura GOMBAUD" userId="95dfd7b3-193d-40a4-ae58-03a5f77a8c61" providerId="ADAL" clId="{CC5B81FC-BCF0-4DCC-9F3E-E0AB1D8A7B60}" dt="2025-08-22T15:19:01.086" v="887" actId="108"/>
         <pc:sldMkLst>
           <pc:docMk/>
           <pc:sldMk cId="4080259528" sldId="310"/>
@@ -547,9 +571,17 @@
             <ac:spMk id="9" creationId="{573108A8-8DFD-8FFF-CF48-03BD57E4C81B}"/>
           </ac:spMkLst>
         </pc:spChg>
+        <pc:spChg chg="mod">
+          <ac:chgData name="Laura GOMBAUD" userId="95dfd7b3-193d-40a4-ae58-03a5f77a8c61" providerId="ADAL" clId="{CC5B81FC-BCF0-4DCC-9F3E-E0AB1D8A7B60}" dt="2025-08-22T15:19:01.086" v="887" actId="108"/>
+          <ac:spMkLst>
+            <pc:docMk/>
+            <pc:sldMk cId="4080259528" sldId="310"/>
+            <ac:spMk id="10" creationId="{8B6D747E-6F76-C3E1-C6F6-2BF058405F5A}"/>
+          </ac:spMkLst>
+        </pc:spChg>
       </pc:sldChg>
       <pc:sldChg chg="modSp add mod">
-        <pc:chgData name="Laura GOMBAUD" userId="95dfd7b3-193d-40a4-ae58-03a5f77a8c61" providerId="ADAL" clId="{CC5B81FC-BCF0-4DCC-9F3E-E0AB1D8A7B60}" dt="2025-08-02T16:01:19.052" v="798" actId="12788"/>
+        <pc:chgData name="Laura GOMBAUD" userId="95dfd7b3-193d-40a4-ae58-03a5f77a8c61" providerId="ADAL" clId="{CC5B81FC-BCF0-4DCC-9F3E-E0AB1D8A7B60}" dt="2025-08-22T15:19:02.766" v="888" actId="108"/>
         <pc:sldMkLst>
           <pc:docMk/>
           <pc:sldMk cId="1775205369" sldId="311"/>
@@ -594,9 +626,17 @@
             <ac:spMk id="9" creationId="{67C7C28C-8913-BA40-0DA0-84BA05F6AEFA}"/>
           </ac:spMkLst>
         </pc:spChg>
+        <pc:spChg chg="mod">
+          <ac:chgData name="Laura GOMBAUD" userId="95dfd7b3-193d-40a4-ae58-03a5f77a8c61" providerId="ADAL" clId="{CC5B81FC-BCF0-4DCC-9F3E-E0AB1D8A7B60}" dt="2025-08-22T15:19:02.766" v="888" actId="108"/>
+          <ac:spMkLst>
+            <pc:docMk/>
+            <pc:sldMk cId="1775205369" sldId="311"/>
+            <ac:spMk id="10" creationId="{F840FE40-E2EA-047E-3CD3-459C2270D071}"/>
+          </ac:spMkLst>
+        </pc:spChg>
       </pc:sldChg>
       <pc:sldChg chg="modSp add mod">
-        <pc:chgData name="Laura GOMBAUD" userId="95dfd7b3-193d-40a4-ae58-03a5f77a8c61" providerId="ADAL" clId="{CC5B81FC-BCF0-4DCC-9F3E-E0AB1D8A7B60}" dt="2025-08-02T16:01:25.204" v="799" actId="12788"/>
+        <pc:chgData name="Laura GOMBAUD" userId="95dfd7b3-193d-40a4-ae58-03a5f77a8c61" providerId="ADAL" clId="{CC5B81FC-BCF0-4DCC-9F3E-E0AB1D8A7B60}" dt="2025-08-22T15:19:04.703" v="889" actId="108"/>
         <pc:sldMkLst>
           <pc:docMk/>
           <pc:sldMk cId="2220482362" sldId="312"/>
@@ -641,9 +681,17 @@
             <ac:spMk id="9" creationId="{48B8B84F-153E-023C-B768-30554ED89EAA}"/>
           </ac:spMkLst>
         </pc:spChg>
+        <pc:spChg chg="mod">
+          <ac:chgData name="Laura GOMBAUD" userId="95dfd7b3-193d-40a4-ae58-03a5f77a8c61" providerId="ADAL" clId="{CC5B81FC-BCF0-4DCC-9F3E-E0AB1D8A7B60}" dt="2025-08-22T15:19:04.703" v="889" actId="108"/>
+          <ac:spMkLst>
+            <pc:docMk/>
+            <pc:sldMk cId="2220482362" sldId="312"/>
+            <ac:spMk id="10" creationId="{BD40877A-A450-026E-4D1C-B8E9AD125E75}"/>
+          </ac:spMkLst>
+        </pc:spChg>
       </pc:sldChg>
       <pc:sldChg chg="modSp add mod">
-        <pc:chgData name="Laura GOMBAUD" userId="95dfd7b3-193d-40a4-ae58-03a5f77a8c61" providerId="ADAL" clId="{CC5B81FC-BCF0-4DCC-9F3E-E0AB1D8A7B60}" dt="2025-08-02T16:01:32.373" v="800" actId="12788"/>
+        <pc:chgData name="Laura GOMBAUD" userId="95dfd7b3-193d-40a4-ae58-03a5f77a8c61" providerId="ADAL" clId="{CC5B81FC-BCF0-4DCC-9F3E-E0AB1D8A7B60}" dt="2025-08-22T15:19:06.899" v="890" actId="108"/>
         <pc:sldMkLst>
           <pc:docMk/>
           <pc:sldMk cId="2086210833" sldId="313"/>
@@ -688,9 +736,17 @@
             <ac:spMk id="9" creationId="{79D74637-1800-056C-6314-45072660A8EC}"/>
           </ac:spMkLst>
         </pc:spChg>
+        <pc:spChg chg="mod">
+          <ac:chgData name="Laura GOMBAUD" userId="95dfd7b3-193d-40a4-ae58-03a5f77a8c61" providerId="ADAL" clId="{CC5B81FC-BCF0-4DCC-9F3E-E0AB1D8A7B60}" dt="2025-08-22T15:19:06.899" v="890" actId="108"/>
+          <ac:spMkLst>
+            <pc:docMk/>
+            <pc:sldMk cId="2086210833" sldId="313"/>
+            <ac:spMk id="10" creationId="{BDC3326F-720C-ADB3-352E-57C551038AA7}"/>
+          </ac:spMkLst>
+        </pc:spChg>
       </pc:sldChg>
       <pc:sldChg chg="modSp add mod">
-        <pc:chgData name="Laura GOMBAUD" userId="95dfd7b3-193d-40a4-ae58-03a5f77a8c61" providerId="ADAL" clId="{CC5B81FC-BCF0-4DCC-9F3E-E0AB1D8A7B60}" dt="2025-08-02T16:04:37.556" v="826" actId="1076"/>
+        <pc:chgData name="Laura GOMBAUD" userId="95dfd7b3-193d-40a4-ae58-03a5f77a8c61" providerId="ADAL" clId="{CC5B81FC-BCF0-4DCC-9F3E-E0AB1D8A7B60}" dt="2025-08-22T15:19:09.043" v="891" actId="108"/>
         <pc:sldMkLst>
           <pc:docMk/>
           <pc:sldMk cId="2935698815" sldId="314"/>
@@ -735,9 +791,17 @@
             <ac:spMk id="9" creationId="{20E78EA0-8B0D-EAD3-F34D-C3C0D1E0E39A}"/>
           </ac:spMkLst>
         </pc:spChg>
+        <pc:spChg chg="mod">
+          <ac:chgData name="Laura GOMBAUD" userId="95dfd7b3-193d-40a4-ae58-03a5f77a8c61" providerId="ADAL" clId="{CC5B81FC-BCF0-4DCC-9F3E-E0AB1D8A7B60}" dt="2025-08-22T15:19:09.043" v="891" actId="108"/>
+          <ac:spMkLst>
+            <pc:docMk/>
+            <pc:sldMk cId="2935698815" sldId="314"/>
+            <ac:spMk id="10" creationId="{3C61FBA0-0B99-5496-F88D-167C262AB574}"/>
+          </ac:spMkLst>
+        </pc:spChg>
       </pc:sldChg>
       <pc:sldChg chg="addSp delSp modSp add mod">
-        <pc:chgData name="Laura GOMBAUD" userId="95dfd7b3-193d-40a4-ae58-03a5f77a8c61" providerId="ADAL" clId="{CC5B81FC-BCF0-4DCC-9F3E-E0AB1D8A7B60}" dt="2025-08-02T16:08:21.073" v="865" actId="20577"/>
+        <pc:chgData name="Laura GOMBAUD" userId="95dfd7b3-193d-40a4-ae58-03a5f77a8c61" providerId="ADAL" clId="{CC5B81FC-BCF0-4DCC-9F3E-E0AB1D8A7B60}" dt="2025-08-22T15:19:10.946" v="892" actId="108"/>
         <pc:sldMkLst>
           <pc:docMk/>
           <pc:sldMk cId="1384263047" sldId="315"/>
@@ -750,6 +814,14 @@
             <ac:spMk id="2" creationId="{BF6953B8-32E4-4A7A-333F-CDD57C928418}"/>
           </ac:spMkLst>
         </pc:spChg>
+        <pc:spChg chg="mod">
+          <ac:chgData name="Laura GOMBAUD" userId="95dfd7b3-193d-40a4-ae58-03a5f77a8c61" providerId="ADAL" clId="{CC5B81FC-BCF0-4DCC-9F3E-E0AB1D8A7B60}" dt="2025-08-22T15:19:10.946" v="892" actId="108"/>
+          <ac:spMkLst>
+            <pc:docMk/>
+            <pc:sldMk cId="1384263047" sldId="315"/>
+            <ac:spMk id="5" creationId="{30F842BB-1D82-17D3-AEF0-5CFA8E4686A1}"/>
+          </ac:spMkLst>
+        </pc:spChg>
         <pc:spChg chg="add mod">
           <ac:chgData name="Laura GOMBAUD" userId="95dfd7b3-193d-40a4-ae58-03a5f77a8c61" providerId="ADAL" clId="{CC5B81FC-BCF0-4DCC-9F3E-E0AB1D8A7B60}" dt="2025-08-02T16:08:21.073" v="865" actId="20577"/>
           <ac:spMkLst>
@@ -760,7 +832,7 @@
         </pc:spChg>
       </pc:sldChg>
       <pc:sldChg chg="delSp modSp add mod ord">
-        <pc:chgData name="Laura GOMBAUD" userId="95dfd7b3-193d-40a4-ae58-03a5f77a8c61" providerId="ADAL" clId="{CC5B81FC-BCF0-4DCC-9F3E-E0AB1D8A7B60}" dt="2025-08-02T16:02:05.989" v="806" actId="12788"/>
+        <pc:chgData name="Laura GOMBAUD" userId="95dfd7b3-193d-40a4-ae58-03a5f77a8c61" providerId="ADAL" clId="{CC5B81FC-BCF0-4DCC-9F3E-E0AB1D8A7B60}" dt="2025-08-22T15:19:12.814" v="893" actId="108"/>
         <pc:sldMkLst>
           <pc:docMk/>
           <pc:sldMk cId="1465314847" sldId="316"/>
@@ -797,9 +869,17 @@
             <ac:spMk id="9" creationId="{AFCFEDAC-34CA-31E4-2053-732189625BF7}"/>
           </ac:spMkLst>
         </pc:spChg>
+        <pc:spChg chg="mod">
+          <ac:chgData name="Laura GOMBAUD" userId="95dfd7b3-193d-40a4-ae58-03a5f77a8c61" providerId="ADAL" clId="{CC5B81FC-BCF0-4DCC-9F3E-E0AB1D8A7B60}" dt="2025-08-22T15:19:12.814" v="893" actId="108"/>
+          <ac:spMkLst>
+            <pc:docMk/>
+            <pc:sldMk cId="1465314847" sldId="316"/>
+            <ac:spMk id="10" creationId="{F0675172-BB28-81A1-5F19-84D1F268A560}"/>
+          </ac:spMkLst>
+        </pc:spChg>
       </pc:sldChg>
       <pc:sldChg chg="addSp modSp add mod">
-        <pc:chgData name="Laura GOMBAUD" userId="95dfd7b3-193d-40a4-ae58-03a5f77a8c61" providerId="ADAL" clId="{CC5B81FC-BCF0-4DCC-9F3E-E0AB1D8A7B60}" dt="2025-08-02T16:02:27.447" v="808" actId="1076"/>
+        <pc:chgData name="Laura GOMBAUD" userId="95dfd7b3-193d-40a4-ae58-03a5f77a8c61" providerId="ADAL" clId="{CC5B81FC-BCF0-4DCC-9F3E-E0AB1D8A7B60}" dt="2025-08-22T15:19:14.930" v="894" actId="108"/>
         <pc:sldMkLst>
           <pc:docMk/>
           <pc:sldMk cId="1170525335" sldId="317"/>
@@ -828,6 +908,14 @@
             <ac:spMk id="7" creationId="{9B8B2049-06CB-4624-82A4-9FE9A0B18DA9}"/>
           </ac:spMkLst>
         </pc:spChg>
+        <pc:spChg chg="mod">
+          <ac:chgData name="Laura GOMBAUD" userId="95dfd7b3-193d-40a4-ae58-03a5f77a8c61" providerId="ADAL" clId="{CC5B81FC-BCF0-4DCC-9F3E-E0AB1D8A7B60}" dt="2025-08-22T15:19:14.930" v="894" actId="108"/>
+          <ac:spMkLst>
+            <pc:docMk/>
+            <pc:sldMk cId="1170525335" sldId="317"/>
+            <ac:spMk id="10" creationId="{3CA0AB42-77E6-E4BA-08BE-58F0A08D431A}"/>
+          </ac:spMkLst>
+        </pc:spChg>
         <pc:spChg chg="add mod">
           <ac:chgData name="Laura GOMBAUD" userId="95dfd7b3-193d-40a4-ae58-03a5f77a8c61" providerId="ADAL" clId="{CC5B81FC-BCF0-4DCC-9F3E-E0AB1D8A7B60}" dt="2025-08-02T15:30:42.087" v="448"/>
           <ac:spMkLst>
@@ -838,7 +926,7 @@
         </pc:spChg>
       </pc:sldChg>
       <pc:sldChg chg="modSp add mod">
-        <pc:chgData name="Laura GOMBAUD" userId="95dfd7b3-193d-40a4-ae58-03a5f77a8c61" providerId="ADAL" clId="{CC5B81FC-BCF0-4DCC-9F3E-E0AB1D8A7B60}" dt="2025-08-02T16:02:34.766" v="809" actId="12788"/>
+        <pc:chgData name="Laura GOMBAUD" userId="95dfd7b3-193d-40a4-ae58-03a5f77a8c61" providerId="ADAL" clId="{CC5B81FC-BCF0-4DCC-9F3E-E0AB1D8A7B60}" dt="2025-08-22T15:19:17.020" v="895" actId="108"/>
         <pc:sldMkLst>
           <pc:docMk/>
           <pc:sldMk cId="18143698" sldId="318"/>
@@ -875,9 +963,17 @@
             <ac:spMk id="9" creationId="{C3817EB8-AE08-6A94-867B-46B22693DC3E}"/>
           </ac:spMkLst>
         </pc:spChg>
+        <pc:spChg chg="mod">
+          <ac:chgData name="Laura GOMBAUD" userId="95dfd7b3-193d-40a4-ae58-03a5f77a8c61" providerId="ADAL" clId="{CC5B81FC-BCF0-4DCC-9F3E-E0AB1D8A7B60}" dt="2025-08-22T15:19:17.020" v="895" actId="108"/>
+          <ac:spMkLst>
+            <pc:docMk/>
+            <pc:sldMk cId="18143698" sldId="318"/>
+            <ac:spMk id="10" creationId="{1C6AB325-0EB6-356C-674E-F84C8406E11F}"/>
+          </ac:spMkLst>
+        </pc:spChg>
       </pc:sldChg>
       <pc:sldChg chg="modSp add mod">
-        <pc:chgData name="Laura GOMBAUD" userId="95dfd7b3-193d-40a4-ae58-03a5f77a8c61" providerId="ADAL" clId="{CC5B81FC-BCF0-4DCC-9F3E-E0AB1D8A7B60}" dt="2025-08-02T16:02:48.307" v="812" actId="1076"/>
+        <pc:chgData name="Laura GOMBAUD" userId="95dfd7b3-193d-40a4-ae58-03a5f77a8c61" providerId="ADAL" clId="{CC5B81FC-BCF0-4DCC-9F3E-E0AB1D8A7B60}" dt="2025-08-22T15:19:19.075" v="896" actId="108"/>
         <pc:sldMkLst>
           <pc:docMk/>
           <pc:sldMk cId="2289398483" sldId="319"/>
@@ -914,9 +1010,17 @@
             <ac:spMk id="9" creationId="{9E380D92-7C5B-E6D3-A013-9B0E2163ADDD}"/>
           </ac:spMkLst>
         </pc:spChg>
+        <pc:spChg chg="mod">
+          <ac:chgData name="Laura GOMBAUD" userId="95dfd7b3-193d-40a4-ae58-03a5f77a8c61" providerId="ADAL" clId="{CC5B81FC-BCF0-4DCC-9F3E-E0AB1D8A7B60}" dt="2025-08-22T15:19:19.075" v="896" actId="108"/>
+          <ac:spMkLst>
+            <pc:docMk/>
+            <pc:sldMk cId="2289398483" sldId="319"/>
+            <ac:spMk id="10" creationId="{C284BEA6-183F-EEBD-CB6B-A8C9AA6C0210}"/>
+          </ac:spMkLst>
+        </pc:spChg>
       </pc:sldChg>
       <pc:sldChg chg="modSp add mod">
-        <pc:chgData name="Laura GOMBAUD" userId="95dfd7b3-193d-40a4-ae58-03a5f77a8c61" providerId="ADAL" clId="{CC5B81FC-BCF0-4DCC-9F3E-E0AB1D8A7B60}" dt="2025-08-02T16:03:05.023" v="816" actId="1076"/>
+        <pc:chgData name="Laura GOMBAUD" userId="95dfd7b3-193d-40a4-ae58-03a5f77a8c61" providerId="ADAL" clId="{CC5B81FC-BCF0-4DCC-9F3E-E0AB1D8A7B60}" dt="2025-08-22T15:19:21.025" v="897" actId="108"/>
         <pc:sldMkLst>
           <pc:docMk/>
           <pc:sldMk cId="2756811775" sldId="320"/>
@@ -945,9 +1049,17 @@
             <ac:spMk id="7" creationId="{F1196FDE-D7F1-23F8-CD82-F8D0FA6AD1A5}"/>
           </ac:spMkLst>
         </pc:spChg>
+        <pc:spChg chg="mod">
+          <ac:chgData name="Laura GOMBAUD" userId="95dfd7b3-193d-40a4-ae58-03a5f77a8c61" providerId="ADAL" clId="{CC5B81FC-BCF0-4DCC-9F3E-E0AB1D8A7B60}" dt="2025-08-22T15:19:21.025" v="897" actId="108"/>
+          <ac:spMkLst>
+            <pc:docMk/>
+            <pc:sldMk cId="2756811775" sldId="320"/>
+            <ac:spMk id="10" creationId="{6D473131-9318-D066-5664-AE6AB75DAE8B}"/>
+          </ac:spMkLst>
+        </pc:spChg>
       </pc:sldChg>
       <pc:sldChg chg="modSp add mod">
-        <pc:chgData name="Laura GOMBAUD" userId="95dfd7b3-193d-40a4-ae58-03a5f77a8c61" providerId="ADAL" clId="{CC5B81FC-BCF0-4DCC-9F3E-E0AB1D8A7B60}" dt="2025-08-02T16:03:16.318" v="817" actId="1076"/>
+        <pc:chgData name="Laura GOMBAUD" userId="95dfd7b3-193d-40a4-ae58-03a5f77a8c61" providerId="ADAL" clId="{CC5B81FC-BCF0-4DCC-9F3E-E0AB1D8A7B60}" dt="2025-08-22T15:19:22.992" v="898" actId="108"/>
         <pc:sldMkLst>
           <pc:docMk/>
           <pc:sldMk cId="3262616194" sldId="321"/>
@@ -976,9 +1088,17 @@
             <ac:spMk id="7" creationId="{C62F43B3-075F-BAEA-BBEE-371466BF5672}"/>
           </ac:spMkLst>
         </pc:spChg>
+        <pc:spChg chg="mod">
+          <ac:chgData name="Laura GOMBAUD" userId="95dfd7b3-193d-40a4-ae58-03a5f77a8c61" providerId="ADAL" clId="{CC5B81FC-BCF0-4DCC-9F3E-E0AB1D8A7B60}" dt="2025-08-22T15:19:22.992" v="898" actId="108"/>
+          <ac:spMkLst>
+            <pc:docMk/>
+            <pc:sldMk cId="3262616194" sldId="321"/>
+            <ac:spMk id="10" creationId="{BD6575E4-3E25-2C42-7E8D-F2208198A989}"/>
+          </ac:spMkLst>
+        </pc:spChg>
       </pc:sldChg>
       <pc:sldChg chg="modSp add mod">
-        <pc:chgData name="Laura GOMBAUD" userId="95dfd7b3-193d-40a4-ae58-03a5f77a8c61" providerId="ADAL" clId="{CC5B81FC-BCF0-4DCC-9F3E-E0AB1D8A7B60}" dt="2025-08-02T16:03:23.102" v="818" actId="1076"/>
+        <pc:chgData name="Laura GOMBAUD" userId="95dfd7b3-193d-40a4-ae58-03a5f77a8c61" providerId="ADAL" clId="{CC5B81FC-BCF0-4DCC-9F3E-E0AB1D8A7B60}" dt="2025-08-22T15:19:24.913" v="899" actId="108"/>
         <pc:sldMkLst>
           <pc:docMk/>
           <pc:sldMk cId="1742769489" sldId="322"/>
@@ -1007,9 +1127,17 @@
             <ac:spMk id="7" creationId="{99713734-5E26-C6D5-48E9-EEF06479BE12}"/>
           </ac:spMkLst>
         </pc:spChg>
+        <pc:spChg chg="mod">
+          <ac:chgData name="Laura GOMBAUD" userId="95dfd7b3-193d-40a4-ae58-03a5f77a8c61" providerId="ADAL" clId="{CC5B81FC-BCF0-4DCC-9F3E-E0AB1D8A7B60}" dt="2025-08-22T15:19:24.913" v="899" actId="108"/>
+          <ac:spMkLst>
+            <pc:docMk/>
+            <pc:sldMk cId="1742769489" sldId="322"/>
+            <ac:spMk id="10" creationId="{224C0260-41EE-28FE-FAE4-9849886926F1}"/>
+          </ac:spMkLst>
+        </pc:spChg>
       </pc:sldChg>
       <pc:sldChg chg="modSp add mod">
-        <pc:chgData name="Laura GOMBAUD" userId="95dfd7b3-193d-40a4-ae58-03a5f77a8c61" providerId="ADAL" clId="{CC5B81FC-BCF0-4DCC-9F3E-E0AB1D8A7B60}" dt="2025-08-02T16:03:36.142" v="822" actId="1076"/>
+        <pc:chgData name="Laura GOMBAUD" userId="95dfd7b3-193d-40a4-ae58-03a5f77a8c61" providerId="ADAL" clId="{CC5B81FC-BCF0-4DCC-9F3E-E0AB1D8A7B60}" dt="2025-08-22T15:19:26.900" v="900" actId="108"/>
         <pc:sldMkLst>
           <pc:docMk/>
           <pc:sldMk cId="4235684431" sldId="323"/>
@@ -1038,9 +1166,17 @@
             <ac:spMk id="7" creationId="{1DD191F3-6EF7-AA54-1297-C43844D44678}"/>
           </ac:spMkLst>
         </pc:spChg>
+        <pc:spChg chg="mod">
+          <ac:chgData name="Laura GOMBAUD" userId="95dfd7b3-193d-40a4-ae58-03a5f77a8c61" providerId="ADAL" clId="{CC5B81FC-BCF0-4DCC-9F3E-E0AB1D8A7B60}" dt="2025-08-22T15:19:26.900" v="900" actId="108"/>
+          <ac:spMkLst>
+            <pc:docMk/>
+            <pc:sldMk cId="4235684431" sldId="323"/>
+            <ac:spMk id="10" creationId="{434E0F59-AABC-01BD-73C7-88E25E4C53E2}"/>
+          </ac:spMkLst>
+        </pc:spChg>
       </pc:sldChg>
       <pc:sldChg chg="modSp add mod">
-        <pc:chgData name="Laura GOMBAUD" userId="95dfd7b3-193d-40a4-ae58-03a5f77a8c61" providerId="ADAL" clId="{CC5B81FC-BCF0-4DCC-9F3E-E0AB1D8A7B60}" dt="2025-08-02T16:03:42.270" v="823" actId="1076"/>
+        <pc:chgData name="Laura GOMBAUD" userId="95dfd7b3-193d-40a4-ae58-03a5f77a8c61" providerId="ADAL" clId="{CC5B81FC-BCF0-4DCC-9F3E-E0AB1D8A7B60}" dt="2025-08-22T15:19:28.734" v="901" actId="108"/>
         <pc:sldMkLst>
           <pc:docMk/>
           <pc:sldMk cId="1345448944" sldId="324"/>
@@ -1069,9 +1205,17 @@
             <ac:spMk id="7" creationId="{D10E72AE-3889-F6A0-F218-A8BB54D48E1D}"/>
           </ac:spMkLst>
         </pc:spChg>
+        <pc:spChg chg="mod">
+          <ac:chgData name="Laura GOMBAUD" userId="95dfd7b3-193d-40a4-ae58-03a5f77a8c61" providerId="ADAL" clId="{CC5B81FC-BCF0-4DCC-9F3E-E0AB1D8A7B60}" dt="2025-08-22T15:19:28.734" v="901" actId="108"/>
+          <ac:spMkLst>
+            <pc:docMk/>
+            <pc:sldMk cId="1345448944" sldId="324"/>
+            <ac:spMk id="10" creationId="{1E98DBEE-CC60-3CCB-6A59-57A7A561ED51}"/>
+          </ac:spMkLst>
+        </pc:spChg>
       </pc:sldChg>
       <pc:sldChg chg="modSp add mod modClrScheme chgLayout">
-        <pc:chgData name="Laura GOMBAUD" userId="95dfd7b3-193d-40a4-ae58-03a5f77a8c61" providerId="ADAL" clId="{CC5B81FC-BCF0-4DCC-9F3E-E0AB1D8A7B60}" dt="2025-08-02T16:03:47.672" v="824" actId="1076"/>
+        <pc:chgData name="Laura GOMBAUD" userId="95dfd7b3-193d-40a4-ae58-03a5f77a8c61" providerId="ADAL" clId="{CC5B81FC-BCF0-4DCC-9F3E-E0AB1D8A7B60}" dt="2025-08-22T15:19:30.710" v="902" actId="108"/>
         <pc:sldMkLst>
           <pc:docMk/>
           <pc:sldMk cId="1932972838" sldId="325"/>
@@ -1101,7 +1245,7 @@
           </ac:spMkLst>
         </pc:spChg>
         <pc:spChg chg="mod ord">
-          <ac:chgData name="Laura GOMBAUD" userId="95dfd7b3-193d-40a4-ae58-03a5f77a8c61" providerId="ADAL" clId="{CC5B81FC-BCF0-4DCC-9F3E-E0AB1D8A7B60}" dt="2025-08-02T15:50:34.210" v="724" actId="700"/>
+          <ac:chgData name="Laura GOMBAUD" userId="95dfd7b3-193d-40a4-ae58-03a5f77a8c61" providerId="ADAL" clId="{CC5B81FC-BCF0-4DCC-9F3E-E0AB1D8A7B60}" dt="2025-08-22T15:19:30.710" v="902" actId="108"/>
           <ac:spMkLst>
             <pc:docMk/>
             <pc:sldMk cId="1932972838" sldId="325"/>
@@ -1110,7 +1254,7 @@
         </pc:spChg>
       </pc:sldChg>
       <pc:sldChg chg="modSp add mod ord">
-        <pc:chgData name="Laura GOMBAUD" userId="95dfd7b3-193d-40a4-ae58-03a5f77a8c61" providerId="ADAL" clId="{CC5B81FC-BCF0-4DCC-9F3E-E0AB1D8A7B60}" dt="2025-08-02T15:35:55.391" v="603" actId="20577"/>
+        <pc:chgData name="Laura GOMBAUD" userId="95dfd7b3-193d-40a4-ae58-03a5f77a8c61" providerId="ADAL" clId="{CC5B81FC-BCF0-4DCC-9F3E-E0AB1D8A7B60}" dt="2025-08-22T15:19:32.548" v="903" actId="108"/>
         <pc:sldMkLst>
           <pc:docMk/>
           <pc:sldMk cId="3606703822" sldId="326"/>
@@ -1131,9 +1275,17 @@
             <ac:spMk id="3" creationId="{D0301589-CD0E-D5DA-797E-FD3C4A5F7E91}"/>
           </ac:spMkLst>
         </pc:spChg>
+        <pc:spChg chg="mod">
+          <ac:chgData name="Laura GOMBAUD" userId="95dfd7b3-193d-40a4-ae58-03a5f77a8c61" providerId="ADAL" clId="{CC5B81FC-BCF0-4DCC-9F3E-E0AB1D8A7B60}" dt="2025-08-22T15:19:32.548" v="903" actId="108"/>
+          <ac:spMkLst>
+            <pc:docMk/>
+            <pc:sldMk cId="3606703822" sldId="326"/>
+            <ac:spMk id="5" creationId="{64091D33-6C5D-A63C-04BD-367FA763A9CF}"/>
+          </ac:spMkLst>
+        </pc:spChg>
       </pc:sldChg>
       <pc:sldChg chg="addSp modSp add mod">
-        <pc:chgData name="Laura GOMBAUD" userId="95dfd7b3-193d-40a4-ae58-03a5f77a8c61" providerId="ADAL" clId="{CC5B81FC-BCF0-4DCC-9F3E-E0AB1D8A7B60}" dt="2025-08-02T16:00:35.342" v="797"/>
+        <pc:chgData name="Laura GOMBAUD" userId="95dfd7b3-193d-40a4-ae58-03a5f77a8c61" providerId="ADAL" clId="{CC5B81FC-BCF0-4DCC-9F3E-E0AB1D8A7B60}" dt="2025-08-22T15:18:49.456" v="883" actId="108"/>
         <pc:sldMkLst>
           <pc:docMk/>
           <pc:sldMk cId="2353639268" sldId="327"/>
@@ -1170,6 +1322,14 @@
             <ac:spMk id="9" creationId="{6E87BB18-2D39-227E-A74C-F543DE2F5D5B}"/>
           </ac:spMkLst>
         </pc:spChg>
+        <pc:spChg chg="mod">
+          <ac:chgData name="Laura GOMBAUD" userId="95dfd7b3-193d-40a4-ae58-03a5f77a8c61" providerId="ADAL" clId="{CC5B81FC-BCF0-4DCC-9F3E-E0AB1D8A7B60}" dt="2025-08-22T15:18:49.456" v="883" actId="108"/>
+          <ac:spMkLst>
+            <pc:docMk/>
+            <pc:sldMk cId="2353639268" sldId="327"/>
+            <ac:spMk id="10" creationId="{645E1B94-4FB1-40AF-2FF2-2DFB98E613B7}"/>
+          </ac:spMkLst>
+        </pc:spChg>
         <pc:spChg chg="add mod">
           <ac:chgData name="Laura GOMBAUD" userId="95dfd7b3-193d-40a4-ae58-03a5f77a8c61" providerId="ADAL" clId="{CC5B81FC-BCF0-4DCC-9F3E-E0AB1D8A7B60}" dt="2025-08-02T16:00:35.342" v="797"/>
           <ac:spMkLst>
@@ -1202,14 +1362,6 @@
             <ac:spMk id="7" creationId="{72310CF3-A3B1-6107-1C8D-E267C2B6204B}"/>
           </ac:spMkLst>
         </pc:spChg>
-        <pc:spChg chg="add del">
-          <ac:chgData name="laura-gombaud@laposte.net" userId="S::urn:spo:guest#laura-gombaud@laposte.net::" providerId="AD" clId="Web-{DDB080E2-2F19-07BF-4774-7E4FA0117116}" dt="2025-08-19T17:55:32.294" v="2"/>
-          <ac:spMkLst>
-            <pc:docMk/>
-            <pc:sldMk cId="1566335460" sldId="305"/>
-            <ac:spMk id="11" creationId="{717D5111-D41C-9721-1467-F77F4B6B05FF}"/>
-          </ac:spMkLst>
-        </pc:spChg>
       </pc:sldChg>
     </pc:docChg>
   </pc:docChgLst>
@@ -1298,7 +1450,7 @@
           <a:p>
             <a:fld id="{56C2D11A-4A4C-4762-9A3D-38B816BFA086}" type="datetimeFigureOut">
               <a:rPr lang="fr-FR" smtClean="0"/>
-              <a:t>19/08/2025</a:t>
+              <a:t>07/09/2025</a:t>
             </a:fld>
             <a:endParaRPr lang="fr-FR" dirty="0"/>
           </a:p>
@@ -1463,7 +1615,7 @@
           <a:p>
             <a:fld id="{DD3E8838-E61C-436D-81FA-CFC9A861CF2C}" type="datetimeFigureOut">
               <a:rPr lang="fr-FR" noProof="0" smtClean="0"/>
-              <a:t>19/08/2025</a:t>
+              <a:t>07/09/2025</a:t>
             </a:fld>
             <a:endParaRPr lang="fr-FR" noProof="0" dirty="0"/>
           </a:p>
@@ -4221,7 +4373,7 @@
             <a:pPr rtl="0"/>
             <a:fld id="{9587721F-3185-444B-8A6E-326F6B2AB697}" type="datetime1">
               <a:rPr lang="fr-FR" noProof="0" smtClean="0"/>
-              <a:t>19/08/2025</a:t>
+              <a:t>07/09/2025</a:t>
             </a:fld>
             <a:endParaRPr lang="fr-FR" noProof="0" dirty="0"/>
           </a:p>
@@ -4413,7 +4565,7 @@
             <a:pPr rtl="0"/>
             <a:fld id="{CAA23075-D5B4-4D52-9B89-68EE0438A58F}" type="datetime1">
               <a:rPr lang="fr-FR" noProof="0" smtClean="0"/>
-              <a:t>19/08/2025</a:t>
+              <a:t>07/09/2025</a:t>
             </a:fld>
             <a:endParaRPr lang="fr-FR" noProof="0" dirty="0"/>
           </a:p>
@@ -4790,7 +4942,7 @@
             <a:pPr rtl="0"/>
             <a:fld id="{D080B752-939A-40EC-B5F1-35C510FA3513}" type="datetime1">
               <a:rPr lang="fr-FR" noProof="0" smtClean="0"/>
-              <a:t>19/08/2025</a:t>
+              <a:t>07/09/2025</a:t>
             </a:fld>
             <a:endParaRPr lang="fr-FR" noProof="0" dirty="0"/>
           </a:p>
@@ -5049,7 +5201,7 @@
             <a:pPr rtl="0"/>
             <a:fld id="{2CE69316-0016-428B-BFD9-686FC2B4F374}" type="datetime1">
               <a:rPr lang="fr-FR" noProof="0" smtClean="0"/>
-              <a:t>19/08/2025</a:t>
+              <a:t>07/09/2025</a:t>
             </a:fld>
             <a:endParaRPr lang="fr-FR" noProof="0" dirty="0"/>
           </a:p>
@@ -5450,7 +5602,7 @@
             <a:pPr rtl="0"/>
             <a:fld id="{E20EF894-E3E4-4404-BEC0-F5651C8FD36A}" type="datetime1">
               <a:rPr lang="fr-FR" noProof="0" smtClean="0"/>
-              <a:t>19/08/2025</a:t>
+              <a:t>07/09/2025</a:t>
             </a:fld>
             <a:endParaRPr lang="fr-FR" noProof="0" dirty="0"/>
           </a:p>
@@ -5590,7 +5742,7 @@
             <a:pPr rtl="0"/>
             <a:fld id="{4457F949-C19F-4D8E-839F-925D446B89C2}" type="datetime1">
               <a:rPr lang="fr-FR" noProof="0" smtClean="0"/>
-              <a:t>19/08/2025</a:t>
+              <a:t>07/09/2025</a:t>
             </a:fld>
             <a:endParaRPr lang="fr-FR" noProof="0" dirty="0"/>
           </a:p>
@@ -5750,7 +5902,7 @@
             <a:pPr rtl="0"/>
             <a:fld id="{6B916F45-0E8E-45E3-B712-999CB50501FA}" type="datetime1">
               <a:rPr lang="fr-FR" noProof="0" smtClean="0"/>
-              <a:t>19/08/2025</a:t>
+              <a:t>07/09/2025</a:t>
             </a:fld>
             <a:endParaRPr lang="fr-FR" noProof="0" dirty="0"/>
           </a:p>
@@ -6083,7 +6235,7 @@
             <a:pPr rtl="0"/>
             <a:fld id="{9242C866-518F-4894-BA37-9E6440D24800}" type="datetime1">
               <a:rPr lang="fr-FR" noProof="0" smtClean="0"/>
-              <a:t>19/08/2025</a:t>
+              <a:t>07/09/2025</a:t>
             </a:fld>
             <a:endParaRPr lang="fr-FR" noProof="0" dirty="0"/>
           </a:p>
@@ -6438,7 +6590,7 @@
             <a:pPr rtl="0"/>
             <a:fld id="{34039B9A-10CC-4A84-A79F-08E9B713CC1A}" type="datetime1">
               <a:rPr lang="fr-FR" noProof="0" smtClean="0"/>
-              <a:t>19/08/2025</a:t>
+              <a:t>07/09/2025</a:t>
             </a:fld>
             <a:endParaRPr lang="fr-FR" noProof="0" dirty="0"/>
           </a:p>
@@ -6700,7 +6852,7 @@
             <a:pPr rtl="0"/>
             <a:fld id="{5584245D-0409-40CB-8354-41999F9BF1A0}" type="datetime1">
               <a:rPr lang="fr-FR" noProof="0" smtClean="0"/>
-              <a:t>19/08/2025</a:t>
+              <a:t>07/09/2025</a:t>
             </a:fld>
             <a:endParaRPr lang="fr-FR" noProof="0" dirty="0"/>
           </a:p>
@@ -7670,21 +7822,26 @@
             <p:ph type="sldNum" sz="quarter" idx="12"/>
           </p:nvPr>
         </p:nvSpPr>
-        <p:spPr/>
+        <p:spPr>
+          <a:xfrm>
+            <a:off x="11018713" y="6407776"/>
+            <a:ext cx="780010" cy="365125"/>
+          </a:xfrm>
+        </p:spPr>
         <p:txBody>
           <a:bodyPr/>
           <a:lstStyle/>
           <a:p>
             <a:pPr rtl="0"/>
             <a:fld id="{3A98EE3D-8CD1-4C3F-BD1C-C98C9596463C}" type="slidenum">
-              <a:rPr lang="fr-FR" noProof="0" smtClean="0">
+              <a:rPr lang="fr-FR" sz="3200" b="1" noProof="0" smtClean="0">
                 <a:latin typeface="Calibri" panose="020F0502020204030204" pitchFamily="34" charset="0"/>
                 <a:ea typeface="Calibri" panose="020F0502020204030204" pitchFamily="34" charset="0"/>
                 <a:cs typeface="Calibri" panose="020F0502020204030204" pitchFamily="34" charset="0"/>
               </a:rPr>
               <a:t>1</a:t>
             </a:fld>
-            <a:endParaRPr lang="fr-FR" noProof="0" dirty="0">
+            <a:endParaRPr lang="fr-FR" sz="900" b="1" noProof="0" dirty="0">
               <a:latin typeface="Calibri" panose="020F0502020204030204" pitchFamily="34" charset="0"/>
               <a:ea typeface="Calibri" panose="020F0502020204030204" pitchFamily="34" charset="0"/>
               <a:cs typeface="Calibri" panose="020F0502020204030204" pitchFamily="34" charset="0"/>
@@ -8189,19 +8346,19 @@
         </p:nvSpPr>
         <p:spPr/>
         <p:txBody>
-          <a:bodyPr/>
-          <a:lstStyle/>
-          <a:p>
-            <a:pPr rtl="0"/>
+          <a:bodyPr vert="horz" lIns="91440" tIns="45720" rIns="91440" bIns="45720" rtlCol="0" anchor="ctr"/>
+          <a:lstStyle/>
+          <a:p>
             <a:fld id="{3A98EE3D-8CD1-4C3F-BD1C-C98C9596463C}" type="slidenum">
-              <a:rPr lang="fr-FR" noProof="0" smtClean="0">
+              <a:rPr lang="fr-FR" sz="3200" b="1">
                 <a:latin typeface="Calibri" panose="020F0502020204030204" pitchFamily="34" charset="0"/>
                 <a:ea typeface="Calibri" panose="020F0502020204030204" pitchFamily="34" charset="0"/>
                 <a:cs typeface="Calibri" panose="020F0502020204030204" pitchFamily="34" charset="0"/>
               </a:rPr>
+              <a:pPr/>
               <a:t>10</a:t>
             </a:fld>
-            <a:endParaRPr lang="fr-FR" noProof="0" dirty="0">
+            <a:endParaRPr lang="fr-FR" sz="3200" b="1" dirty="0">
               <a:latin typeface="Calibri" panose="020F0502020204030204" pitchFamily="34" charset="0"/>
               <a:ea typeface="Calibri" panose="020F0502020204030204" pitchFamily="34" charset="0"/>
               <a:cs typeface="Calibri" panose="020F0502020204030204" pitchFamily="34" charset="0"/>
@@ -8912,19 +9069,19 @@
         </p:nvSpPr>
         <p:spPr/>
         <p:txBody>
-          <a:bodyPr/>
-          <a:lstStyle/>
-          <a:p>
-            <a:pPr rtl="0"/>
+          <a:bodyPr vert="horz" lIns="91440" tIns="45720" rIns="91440" bIns="45720" rtlCol="0" anchor="ctr"/>
+          <a:lstStyle/>
+          <a:p>
             <a:fld id="{3A98EE3D-8CD1-4C3F-BD1C-C98C9596463C}" type="slidenum">
-              <a:rPr lang="fr-FR" noProof="0" smtClean="0">
+              <a:rPr lang="fr-FR" sz="3200" b="1">
                 <a:latin typeface="Calibri" panose="020F0502020204030204" pitchFamily="34" charset="0"/>
                 <a:ea typeface="Calibri" panose="020F0502020204030204" pitchFamily="34" charset="0"/>
                 <a:cs typeface="Calibri" panose="020F0502020204030204" pitchFamily="34" charset="0"/>
               </a:rPr>
+              <a:pPr/>
               <a:t>11</a:t>
             </a:fld>
-            <a:endParaRPr lang="fr-FR" noProof="0" dirty="0">
+            <a:endParaRPr lang="fr-FR" sz="3200" b="1" dirty="0">
               <a:latin typeface="Calibri" panose="020F0502020204030204" pitchFamily="34" charset="0"/>
               <a:ea typeface="Calibri" panose="020F0502020204030204" pitchFamily="34" charset="0"/>
               <a:cs typeface="Calibri" panose="020F0502020204030204" pitchFamily="34" charset="0"/>
@@ -9635,19 +9792,19 @@
         </p:nvSpPr>
         <p:spPr/>
         <p:txBody>
-          <a:bodyPr/>
-          <a:lstStyle/>
-          <a:p>
-            <a:pPr rtl="0"/>
+          <a:bodyPr vert="horz" lIns="91440" tIns="45720" rIns="91440" bIns="45720" rtlCol="0" anchor="ctr"/>
+          <a:lstStyle/>
+          <a:p>
             <a:fld id="{3A98EE3D-8CD1-4C3F-BD1C-C98C9596463C}" type="slidenum">
-              <a:rPr lang="fr-FR" noProof="0" smtClean="0">
+              <a:rPr lang="fr-FR" sz="3200" b="1">
                 <a:latin typeface="Calibri" panose="020F0502020204030204" pitchFamily="34" charset="0"/>
                 <a:ea typeface="Calibri" panose="020F0502020204030204" pitchFamily="34" charset="0"/>
                 <a:cs typeface="Calibri" panose="020F0502020204030204" pitchFamily="34" charset="0"/>
               </a:rPr>
+              <a:pPr/>
               <a:t>12</a:t>
             </a:fld>
-            <a:endParaRPr lang="fr-FR" noProof="0" dirty="0">
+            <a:endParaRPr lang="fr-FR" sz="3200" b="1" dirty="0">
               <a:latin typeface="Calibri" panose="020F0502020204030204" pitchFamily="34" charset="0"/>
               <a:ea typeface="Calibri" panose="020F0502020204030204" pitchFamily="34" charset="0"/>
               <a:cs typeface="Calibri" panose="020F0502020204030204" pitchFamily="34" charset="0"/>
@@ -10017,19 +10174,19 @@
         </p:nvSpPr>
         <p:spPr/>
         <p:txBody>
-          <a:bodyPr/>
-          <a:lstStyle/>
-          <a:p>
-            <a:pPr rtl="0"/>
+          <a:bodyPr vert="horz" lIns="91440" tIns="45720" rIns="91440" bIns="45720" rtlCol="0" anchor="ctr"/>
+          <a:lstStyle/>
+          <a:p>
             <a:fld id="{3A98EE3D-8CD1-4C3F-BD1C-C98C9596463C}" type="slidenum">
-              <a:rPr lang="fr-FR" noProof="0" smtClean="0">
+              <a:rPr lang="fr-FR" sz="3200" b="1">
                 <a:latin typeface="Calibri" panose="020F0502020204030204" pitchFamily="34" charset="0"/>
                 <a:ea typeface="Calibri" panose="020F0502020204030204" pitchFamily="34" charset="0"/>
                 <a:cs typeface="Calibri" panose="020F0502020204030204" pitchFamily="34" charset="0"/>
               </a:rPr>
+              <a:pPr/>
               <a:t>13</a:t>
             </a:fld>
-            <a:endParaRPr lang="fr-FR" noProof="0" dirty="0">
+            <a:endParaRPr lang="fr-FR" sz="3200" b="1" dirty="0">
               <a:latin typeface="Calibri" panose="020F0502020204030204" pitchFamily="34" charset="0"/>
               <a:ea typeface="Calibri" panose="020F0502020204030204" pitchFamily="34" charset="0"/>
               <a:cs typeface="Calibri" panose="020F0502020204030204" pitchFamily="34" charset="0"/>
@@ -10534,19 +10691,19 @@
         </p:nvSpPr>
         <p:spPr/>
         <p:txBody>
-          <a:bodyPr/>
-          <a:lstStyle/>
-          <a:p>
-            <a:pPr rtl="0"/>
+          <a:bodyPr vert="horz" lIns="91440" tIns="45720" rIns="91440" bIns="45720" rtlCol="0" anchor="ctr"/>
+          <a:lstStyle/>
+          <a:p>
             <a:fld id="{3A98EE3D-8CD1-4C3F-BD1C-C98C9596463C}" type="slidenum">
-              <a:rPr lang="fr-FR" noProof="0" smtClean="0">
+              <a:rPr lang="fr-FR" sz="3200" b="1">
                 <a:latin typeface="Calibri" panose="020F0502020204030204" pitchFamily="34" charset="0"/>
                 <a:ea typeface="Calibri" panose="020F0502020204030204" pitchFamily="34" charset="0"/>
                 <a:cs typeface="Calibri" panose="020F0502020204030204" pitchFamily="34" charset="0"/>
               </a:rPr>
+              <a:pPr/>
               <a:t>14</a:t>
             </a:fld>
-            <a:endParaRPr lang="fr-FR" noProof="0" dirty="0">
+            <a:endParaRPr lang="fr-FR" sz="3200" b="1" dirty="0">
               <a:latin typeface="Calibri" panose="020F0502020204030204" pitchFamily="34" charset="0"/>
               <a:ea typeface="Calibri" panose="020F0502020204030204" pitchFamily="34" charset="0"/>
               <a:cs typeface="Calibri" panose="020F0502020204030204" pitchFamily="34" charset="0"/>
@@ -11200,19 +11357,19 @@
         </p:nvSpPr>
         <p:spPr/>
         <p:txBody>
-          <a:bodyPr/>
-          <a:lstStyle/>
-          <a:p>
-            <a:pPr rtl="0"/>
+          <a:bodyPr vert="horz" lIns="91440" tIns="45720" rIns="91440" bIns="45720" rtlCol="0" anchor="ctr"/>
+          <a:lstStyle/>
+          <a:p>
             <a:fld id="{3A98EE3D-8CD1-4C3F-BD1C-C98C9596463C}" type="slidenum">
-              <a:rPr lang="fr-FR" noProof="0" smtClean="0">
+              <a:rPr lang="fr-FR" sz="3200" b="1">
                 <a:latin typeface="Calibri" panose="020F0502020204030204" pitchFamily="34" charset="0"/>
                 <a:ea typeface="Calibri" panose="020F0502020204030204" pitchFamily="34" charset="0"/>
                 <a:cs typeface="Calibri" panose="020F0502020204030204" pitchFamily="34" charset="0"/>
               </a:rPr>
+              <a:pPr/>
               <a:t>15</a:t>
             </a:fld>
-            <a:endParaRPr lang="fr-FR" noProof="0" dirty="0">
+            <a:endParaRPr lang="fr-FR" sz="3200" b="1" dirty="0">
               <a:latin typeface="Calibri" panose="020F0502020204030204" pitchFamily="34" charset="0"/>
               <a:ea typeface="Calibri" panose="020F0502020204030204" pitchFamily="34" charset="0"/>
               <a:cs typeface="Calibri" panose="020F0502020204030204" pitchFamily="34" charset="0"/>
@@ -11923,19 +12080,19 @@
         </p:nvSpPr>
         <p:spPr/>
         <p:txBody>
-          <a:bodyPr/>
-          <a:lstStyle/>
-          <a:p>
-            <a:pPr rtl="0"/>
+          <a:bodyPr vert="horz" lIns="91440" tIns="45720" rIns="91440" bIns="45720" rtlCol="0" anchor="ctr"/>
+          <a:lstStyle/>
+          <a:p>
             <a:fld id="{3A98EE3D-8CD1-4C3F-BD1C-C98C9596463C}" type="slidenum">
-              <a:rPr lang="fr-FR" noProof="0" smtClean="0">
+              <a:rPr lang="fr-FR" sz="3200" b="1">
                 <a:latin typeface="Calibri" panose="020F0502020204030204" pitchFamily="34" charset="0"/>
                 <a:ea typeface="Calibri" panose="020F0502020204030204" pitchFamily="34" charset="0"/>
                 <a:cs typeface="Calibri" panose="020F0502020204030204" pitchFamily="34" charset="0"/>
               </a:rPr>
+              <a:pPr/>
               <a:t>16</a:t>
             </a:fld>
-            <a:endParaRPr lang="fr-FR" noProof="0" dirty="0">
+            <a:endParaRPr lang="fr-FR" sz="3200" b="1" dirty="0">
               <a:latin typeface="Calibri" panose="020F0502020204030204" pitchFamily="34" charset="0"/>
               <a:ea typeface="Calibri" panose="020F0502020204030204" pitchFamily="34" charset="0"/>
               <a:cs typeface="Calibri" panose="020F0502020204030204" pitchFamily="34" charset="0"/>
@@ -12646,19 +12803,19 @@
         </p:nvSpPr>
         <p:spPr/>
         <p:txBody>
-          <a:bodyPr/>
-          <a:lstStyle/>
-          <a:p>
-            <a:pPr rtl="0"/>
+          <a:bodyPr vert="horz" lIns="91440" tIns="45720" rIns="91440" bIns="45720" rtlCol="0" anchor="ctr"/>
+          <a:lstStyle/>
+          <a:p>
             <a:fld id="{3A98EE3D-8CD1-4C3F-BD1C-C98C9596463C}" type="slidenum">
-              <a:rPr lang="fr-FR" noProof="0" smtClean="0">
+              <a:rPr lang="fr-FR" sz="3200" b="1">
                 <a:latin typeface="Calibri" panose="020F0502020204030204" pitchFamily="34" charset="0"/>
                 <a:ea typeface="Calibri" panose="020F0502020204030204" pitchFamily="34" charset="0"/>
                 <a:cs typeface="Calibri" panose="020F0502020204030204" pitchFamily="34" charset="0"/>
               </a:rPr>
+              <a:pPr/>
               <a:t>17</a:t>
             </a:fld>
-            <a:endParaRPr lang="fr-FR" noProof="0" dirty="0">
+            <a:endParaRPr lang="fr-FR" sz="3200" b="1" dirty="0">
               <a:latin typeface="Calibri" panose="020F0502020204030204" pitchFamily="34" charset="0"/>
               <a:ea typeface="Calibri" panose="020F0502020204030204" pitchFamily="34" charset="0"/>
               <a:cs typeface="Calibri" panose="020F0502020204030204" pitchFamily="34" charset="0"/>
@@ -13370,19 +13527,19 @@
         </p:nvSpPr>
         <p:spPr/>
         <p:txBody>
-          <a:bodyPr/>
-          <a:lstStyle/>
-          <a:p>
-            <a:pPr rtl="0"/>
+          <a:bodyPr vert="horz" lIns="91440" tIns="45720" rIns="91440" bIns="45720" rtlCol="0" anchor="ctr"/>
+          <a:lstStyle/>
+          <a:p>
             <a:fld id="{3A98EE3D-8CD1-4C3F-BD1C-C98C9596463C}" type="slidenum">
-              <a:rPr lang="fr-FR" noProof="0" smtClean="0">
+              <a:rPr lang="fr-FR" sz="3200" b="1">
                 <a:latin typeface="Calibri" panose="020F0502020204030204" pitchFamily="34" charset="0"/>
                 <a:ea typeface="Calibri" panose="020F0502020204030204" pitchFamily="34" charset="0"/>
                 <a:cs typeface="Calibri" panose="020F0502020204030204" pitchFamily="34" charset="0"/>
               </a:rPr>
+              <a:pPr/>
               <a:t>18</a:t>
             </a:fld>
-            <a:endParaRPr lang="fr-FR" noProof="0" dirty="0">
+            <a:endParaRPr lang="fr-FR" sz="3200" b="1" dirty="0">
               <a:latin typeface="Calibri" panose="020F0502020204030204" pitchFamily="34" charset="0"/>
               <a:ea typeface="Calibri" panose="020F0502020204030204" pitchFamily="34" charset="0"/>
               <a:cs typeface="Calibri" panose="020F0502020204030204" pitchFamily="34" charset="0"/>
@@ -14093,19 +14250,19 @@
         </p:nvSpPr>
         <p:spPr/>
         <p:txBody>
-          <a:bodyPr/>
-          <a:lstStyle/>
-          <a:p>
-            <a:pPr rtl="0"/>
+          <a:bodyPr vert="horz" lIns="91440" tIns="45720" rIns="91440" bIns="45720" rtlCol="0" anchor="ctr"/>
+          <a:lstStyle/>
+          <a:p>
             <a:fld id="{3A98EE3D-8CD1-4C3F-BD1C-C98C9596463C}" type="slidenum">
-              <a:rPr lang="fr-FR" noProof="0" smtClean="0">
+              <a:rPr lang="fr-FR" sz="3200" b="1">
                 <a:latin typeface="Calibri" panose="020F0502020204030204" pitchFamily="34" charset="0"/>
                 <a:ea typeface="Calibri" panose="020F0502020204030204" pitchFamily="34" charset="0"/>
                 <a:cs typeface="Calibri" panose="020F0502020204030204" pitchFamily="34" charset="0"/>
               </a:rPr>
+              <a:pPr/>
               <a:t>19</a:t>
             </a:fld>
-            <a:endParaRPr lang="fr-FR" noProof="0" dirty="0">
+            <a:endParaRPr lang="fr-FR" sz="3200" b="1" dirty="0">
               <a:latin typeface="Calibri" panose="020F0502020204030204" pitchFamily="34" charset="0"/>
               <a:ea typeface="Calibri" panose="020F0502020204030204" pitchFamily="34" charset="0"/>
               <a:cs typeface="Calibri" panose="020F0502020204030204" pitchFamily="34" charset="0"/>
@@ -14469,19 +14626,19 @@
         </p:nvSpPr>
         <p:spPr/>
         <p:txBody>
-          <a:bodyPr/>
-          <a:lstStyle/>
-          <a:p>
-            <a:pPr rtl="0"/>
+          <a:bodyPr vert="horz" lIns="91440" tIns="45720" rIns="91440" bIns="45720" rtlCol="0" anchor="ctr"/>
+          <a:lstStyle/>
+          <a:p>
             <a:fld id="{3A98EE3D-8CD1-4C3F-BD1C-C98C9596463C}" type="slidenum">
-              <a:rPr lang="fr-FR" noProof="0" smtClean="0">
+              <a:rPr lang="fr-FR" sz="3200" b="1">
                 <a:latin typeface="Calibri" panose="020F0502020204030204" pitchFamily="34" charset="0"/>
                 <a:ea typeface="Calibri" panose="020F0502020204030204" pitchFamily="34" charset="0"/>
                 <a:cs typeface="Calibri" panose="020F0502020204030204" pitchFamily="34" charset="0"/>
               </a:rPr>
+              <a:pPr/>
               <a:t>2</a:t>
             </a:fld>
-            <a:endParaRPr lang="fr-FR" noProof="0" dirty="0">
+            <a:endParaRPr lang="fr-FR" sz="3200" b="1" dirty="0">
               <a:latin typeface="Calibri" panose="020F0502020204030204" pitchFamily="34" charset="0"/>
               <a:ea typeface="Calibri" panose="020F0502020204030204" pitchFamily="34" charset="0"/>
               <a:cs typeface="Calibri" panose="020F0502020204030204" pitchFamily="34" charset="0"/>
@@ -14986,19 +15143,19 @@
         </p:nvSpPr>
         <p:spPr/>
         <p:txBody>
-          <a:bodyPr/>
-          <a:lstStyle/>
-          <a:p>
-            <a:pPr rtl="0"/>
+          <a:bodyPr vert="horz" lIns="91440" tIns="45720" rIns="91440" bIns="45720" rtlCol="0" anchor="ctr"/>
+          <a:lstStyle/>
+          <a:p>
             <a:fld id="{3A98EE3D-8CD1-4C3F-BD1C-C98C9596463C}" type="slidenum">
-              <a:rPr lang="fr-FR" noProof="0" smtClean="0">
+              <a:rPr lang="fr-FR" sz="3200" b="1">
                 <a:latin typeface="Calibri" panose="020F0502020204030204" pitchFamily="34" charset="0"/>
                 <a:ea typeface="Calibri" panose="020F0502020204030204" pitchFamily="34" charset="0"/>
                 <a:cs typeface="Calibri" panose="020F0502020204030204" pitchFamily="34" charset="0"/>
               </a:rPr>
+              <a:pPr/>
               <a:t>20</a:t>
             </a:fld>
-            <a:endParaRPr lang="fr-FR" noProof="0" dirty="0">
+            <a:endParaRPr lang="fr-FR" sz="3200" b="1" dirty="0">
               <a:latin typeface="Calibri" panose="020F0502020204030204" pitchFamily="34" charset="0"/>
               <a:ea typeface="Calibri" panose="020F0502020204030204" pitchFamily="34" charset="0"/>
               <a:cs typeface="Calibri" panose="020F0502020204030204" pitchFamily="34" charset="0"/>
@@ -15709,19 +15866,19 @@
         </p:nvSpPr>
         <p:spPr/>
         <p:txBody>
-          <a:bodyPr/>
-          <a:lstStyle/>
-          <a:p>
-            <a:pPr rtl="0"/>
+          <a:bodyPr vert="horz" lIns="91440" tIns="45720" rIns="91440" bIns="45720" rtlCol="0" anchor="ctr"/>
+          <a:lstStyle/>
+          <a:p>
             <a:fld id="{3A98EE3D-8CD1-4C3F-BD1C-C98C9596463C}" type="slidenum">
-              <a:rPr lang="fr-FR" noProof="0" smtClean="0">
+              <a:rPr lang="fr-FR" sz="3200" b="1">
                 <a:latin typeface="Calibri" panose="020F0502020204030204" pitchFamily="34" charset="0"/>
                 <a:ea typeface="Calibri" panose="020F0502020204030204" pitchFamily="34" charset="0"/>
                 <a:cs typeface="Calibri" panose="020F0502020204030204" pitchFamily="34" charset="0"/>
               </a:rPr>
+              <a:pPr/>
               <a:t>21</a:t>
             </a:fld>
-            <a:endParaRPr lang="fr-FR" noProof="0" dirty="0">
+            <a:endParaRPr lang="fr-FR" sz="3200" b="1" dirty="0">
               <a:latin typeface="Calibri" panose="020F0502020204030204" pitchFamily="34" charset="0"/>
               <a:ea typeface="Calibri" panose="020F0502020204030204" pitchFamily="34" charset="0"/>
               <a:cs typeface="Calibri" panose="020F0502020204030204" pitchFamily="34" charset="0"/>
@@ -16432,19 +16589,19 @@
         </p:nvSpPr>
         <p:spPr/>
         <p:txBody>
-          <a:bodyPr/>
-          <a:lstStyle/>
-          <a:p>
-            <a:pPr rtl="0"/>
+          <a:bodyPr vert="horz" lIns="91440" tIns="45720" rIns="91440" bIns="45720" rtlCol="0" anchor="ctr"/>
+          <a:lstStyle/>
+          <a:p>
             <a:fld id="{3A98EE3D-8CD1-4C3F-BD1C-C98C9596463C}" type="slidenum">
-              <a:rPr lang="fr-FR" noProof="0" smtClean="0">
+              <a:rPr lang="fr-FR" sz="3200" b="1">
                 <a:latin typeface="Calibri" panose="020F0502020204030204" pitchFamily="34" charset="0"/>
                 <a:ea typeface="Calibri" panose="020F0502020204030204" pitchFamily="34" charset="0"/>
                 <a:cs typeface="Calibri" panose="020F0502020204030204" pitchFamily="34" charset="0"/>
               </a:rPr>
+              <a:pPr/>
               <a:t>22</a:t>
             </a:fld>
-            <a:endParaRPr lang="fr-FR" noProof="0" dirty="0">
+            <a:endParaRPr lang="fr-FR" sz="3200" b="1" dirty="0">
               <a:latin typeface="Calibri" panose="020F0502020204030204" pitchFamily="34" charset="0"/>
               <a:ea typeface="Calibri" panose="020F0502020204030204" pitchFamily="34" charset="0"/>
               <a:cs typeface="Calibri" panose="020F0502020204030204" pitchFamily="34" charset="0"/>
@@ -17155,19 +17312,19 @@
         </p:nvSpPr>
         <p:spPr/>
         <p:txBody>
-          <a:bodyPr/>
-          <a:lstStyle/>
-          <a:p>
-            <a:pPr rtl="0"/>
+          <a:bodyPr vert="horz" lIns="91440" tIns="45720" rIns="91440" bIns="45720" rtlCol="0" anchor="ctr"/>
+          <a:lstStyle/>
+          <a:p>
             <a:fld id="{3A98EE3D-8CD1-4C3F-BD1C-C98C9596463C}" type="slidenum">
-              <a:rPr lang="fr-FR" noProof="0" smtClean="0">
+              <a:rPr lang="fr-FR" sz="3200" b="1">
                 <a:latin typeface="Calibri" panose="020F0502020204030204" pitchFamily="34" charset="0"/>
                 <a:ea typeface="Calibri" panose="020F0502020204030204" pitchFamily="34" charset="0"/>
                 <a:cs typeface="Calibri" panose="020F0502020204030204" pitchFamily="34" charset="0"/>
               </a:rPr>
+              <a:pPr/>
               <a:t>23</a:t>
             </a:fld>
-            <a:endParaRPr lang="fr-FR" noProof="0" dirty="0">
+            <a:endParaRPr lang="fr-FR" sz="3200" b="1" dirty="0">
               <a:latin typeface="Calibri" panose="020F0502020204030204" pitchFamily="34" charset="0"/>
               <a:ea typeface="Calibri" panose="020F0502020204030204" pitchFamily="34" charset="0"/>
               <a:cs typeface="Calibri" panose="020F0502020204030204" pitchFamily="34" charset="0"/>
@@ -17577,19 +17734,19 @@
         </p:nvSpPr>
         <p:spPr/>
         <p:txBody>
-          <a:bodyPr/>
-          <a:lstStyle/>
-          <a:p>
-            <a:pPr rtl="0"/>
+          <a:bodyPr vert="horz" lIns="91440" tIns="45720" rIns="91440" bIns="45720" rtlCol="0" anchor="ctr"/>
+          <a:lstStyle/>
+          <a:p>
             <a:fld id="{3A98EE3D-8CD1-4C3F-BD1C-C98C9596463C}" type="slidenum">
-              <a:rPr lang="fr-FR" noProof="0" smtClean="0">
+              <a:rPr lang="fr-FR" sz="3200" b="1">
                 <a:latin typeface="Calibri" panose="020F0502020204030204" pitchFamily="34" charset="0"/>
                 <a:ea typeface="Calibri" panose="020F0502020204030204" pitchFamily="34" charset="0"/>
                 <a:cs typeface="Calibri" panose="020F0502020204030204" pitchFamily="34" charset="0"/>
               </a:rPr>
+              <a:pPr/>
               <a:t>24</a:t>
             </a:fld>
-            <a:endParaRPr lang="fr-FR" noProof="0" dirty="0">
+            <a:endParaRPr lang="fr-FR" sz="3200" b="1" dirty="0">
               <a:latin typeface="Calibri" panose="020F0502020204030204" pitchFamily="34" charset="0"/>
               <a:ea typeface="Calibri" panose="020F0502020204030204" pitchFamily="34" charset="0"/>
               <a:cs typeface="Calibri" panose="020F0502020204030204" pitchFamily="34" charset="0"/>
@@ -17828,17 +17985,6 @@
           <a:p>
             <a:pPr algn="ctr"/>
             <a:r>
-              <a:rPr lang="fr-FR" sz="2000" dirty="0" err="1">
-                <a:solidFill>
-                  <a:srgbClr val="002B45"/>
-                </a:solidFill>
-                <a:latin typeface="Calibri" panose="020F0502020204030204" pitchFamily="34" charset="0"/>
-                <a:ea typeface="Calibri" panose="020F0502020204030204" pitchFamily="34" charset="0"/>
-                <a:cs typeface="Calibri" panose="020F0502020204030204" pitchFamily="34" charset="0"/>
-              </a:rPr>
-              <a:t>Ré-interroger</a:t>
-            </a:r>
-            <a:r>
               <a:rPr lang="fr-FR" sz="2000" dirty="0">
                 <a:solidFill>
                   <a:srgbClr val="002B45"/>
@@ -17847,7 +17993,7 @@
                 <a:ea typeface="Calibri" panose="020F0502020204030204" pitchFamily="34" charset="0"/>
                 <a:cs typeface="Calibri" panose="020F0502020204030204" pitchFamily="34" charset="0"/>
               </a:rPr>
-              <a:t> ses motivations</a:t>
+              <a:t>Ré-interroger ses motivations</a:t>
             </a:r>
           </a:p>
         </p:txBody>
@@ -18072,19 +18218,19 @@
         </p:nvSpPr>
         <p:spPr/>
         <p:txBody>
-          <a:bodyPr/>
-          <a:lstStyle/>
-          <a:p>
-            <a:pPr rtl="0"/>
+          <a:bodyPr vert="horz" lIns="91440" tIns="45720" rIns="91440" bIns="45720" rtlCol="0" anchor="ctr"/>
+          <a:lstStyle/>
+          <a:p>
             <a:fld id="{3A98EE3D-8CD1-4C3F-BD1C-C98C9596463C}" type="slidenum">
-              <a:rPr lang="fr-FR" noProof="0" smtClean="0">
+              <a:rPr lang="fr-FR" sz="3200" b="1">
                 <a:latin typeface="Calibri" panose="020F0502020204030204" pitchFamily="34" charset="0"/>
                 <a:ea typeface="Calibri" panose="020F0502020204030204" pitchFamily="34" charset="0"/>
                 <a:cs typeface="Calibri" panose="020F0502020204030204" pitchFamily="34" charset="0"/>
               </a:rPr>
+              <a:pPr/>
               <a:t>3</a:t>
             </a:fld>
-            <a:endParaRPr lang="fr-FR" noProof="0" dirty="0">
+            <a:endParaRPr lang="fr-FR" sz="3200" b="1" dirty="0">
               <a:latin typeface="Calibri" panose="020F0502020204030204" pitchFamily="34" charset="0"/>
               <a:ea typeface="Calibri" panose="020F0502020204030204" pitchFamily="34" charset="0"/>
               <a:cs typeface="Calibri" panose="020F0502020204030204" pitchFamily="34" charset="0"/>
@@ -18747,19 +18893,19 @@
         </p:nvSpPr>
         <p:spPr/>
         <p:txBody>
-          <a:bodyPr/>
-          <a:lstStyle/>
-          <a:p>
-            <a:pPr rtl="0"/>
+          <a:bodyPr vert="horz" lIns="91440" tIns="45720" rIns="91440" bIns="45720" rtlCol="0" anchor="ctr"/>
+          <a:lstStyle/>
+          <a:p>
             <a:fld id="{3A98EE3D-8CD1-4C3F-BD1C-C98C9596463C}" type="slidenum">
-              <a:rPr lang="fr-FR" noProof="0" smtClean="0">
+              <a:rPr lang="fr-FR" sz="3200" b="1">
                 <a:latin typeface="Calibri" panose="020F0502020204030204" pitchFamily="34" charset="0"/>
                 <a:ea typeface="Calibri" panose="020F0502020204030204" pitchFamily="34" charset="0"/>
                 <a:cs typeface="Calibri" panose="020F0502020204030204" pitchFamily="34" charset="0"/>
               </a:rPr>
+              <a:pPr/>
               <a:t>4</a:t>
             </a:fld>
-            <a:endParaRPr lang="fr-FR" noProof="0" dirty="0">
+            <a:endParaRPr lang="fr-FR" sz="3200" b="1" dirty="0">
               <a:latin typeface="Calibri" panose="020F0502020204030204" pitchFamily="34" charset="0"/>
               <a:ea typeface="Calibri" panose="020F0502020204030204" pitchFamily="34" charset="0"/>
               <a:cs typeface="Calibri" panose="020F0502020204030204" pitchFamily="34" charset="0"/>
@@ -19475,19 +19621,19 @@
         </p:nvSpPr>
         <p:spPr/>
         <p:txBody>
-          <a:bodyPr/>
-          <a:lstStyle/>
-          <a:p>
-            <a:pPr rtl="0"/>
+          <a:bodyPr vert="horz" lIns="91440" tIns="45720" rIns="91440" bIns="45720" rtlCol="0" anchor="ctr"/>
+          <a:lstStyle/>
+          <a:p>
             <a:fld id="{3A98EE3D-8CD1-4C3F-BD1C-C98C9596463C}" type="slidenum">
-              <a:rPr lang="fr-FR" noProof="0" smtClean="0">
+              <a:rPr lang="fr-FR" sz="3200" b="1">
                 <a:latin typeface="Calibri" panose="020F0502020204030204" pitchFamily="34" charset="0"/>
                 <a:ea typeface="Calibri" panose="020F0502020204030204" pitchFamily="34" charset="0"/>
                 <a:cs typeface="Calibri" panose="020F0502020204030204" pitchFamily="34" charset="0"/>
               </a:rPr>
+              <a:pPr/>
               <a:t>5</a:t>
             </a:fld>
-            <a:endParaRPr lang="fr-FR" noProof="0" dirty="0">
+            <a:endParaRPr lang="fr-FR" sz="3200" b="1" dirty="0">
               <a:latin typeface="Calibri" panose="020F0502020204030204" pitchFamily="34" charset="0"/>
               <a:ea typeface="Calibri" panose="020F0502020204030204" pitchFamily="34" charset="0"/>
               <a:cs typeface="Calibri" panose="020F0502020204030204" pitchFamily="34" charset="0"/>
@@ -20203,19 +20349,19 @@
         </p:nvSpPr>
         <p:spPr/>
         <p:txBody>
-          <a:bodyPr/>
-          <a:lstStyle/>
-          <a:p>
-            <a:pPr rtl="0"/>
+          <a:bodyPr vert="horz" lIns="91440" tIns="45720" rIns="91440" bIns="45720" rtlCol="0" anchor="ctr"/>
+          <a:lstStyle/>
+          <a:p>
             <a:fld id="{3A98EE3D-8CD1-4C3F-BD1C-C98C9596463C}" type="slidenum">
-              <a:rPr lang="fr-FR" noProof="0" smtClean="0">
+              <a:rPr lang="fr-FR" sz="3200" b="1">
                 <a:latin typeface="Calibri" panose="020F0502020204030204" pitchFamily="34" charset="0"/>
                 <a:ea typeface="Calibri" panose="020F0502020204030204" pitchFamily="34" charset="0"/>
                 <a:cs typeface="Calibri" panose="020F0502020204030204" pitchFamily="34" charset="0"/>
               </a:rPr>
+              <a:pPr/>
               <a:t>6</a:t>
             </a:fld>
-            <a:endParaRPr lang="fr-FR" noProof="0" dirty="0">
+            <a:endParaRPr lang="fr-FR" sz="3200" b="1" dirty="0">
               <a:latin typeface="Calibri" panose="020F0502020204030204" pitchFamily="34" charset="0"/>
               <a:ea typeface="Calibri" panose="020F0502020204030204" pitchFamily="34" charset="0"/>
               <a:cs typeface="Calibri" panose="020F0502020204030204" pitchFamily="34" charset="0"/>
@@ -20926,19 +21072,19 @@
         </p:nvSpPr>
         <p:spPr/>
         <p:txBody>
-          <a:bodyPr/>
-          <a:lstStyle/>
-          <a:p>
-            <a:pPr rtl="0"/>
+          <a:bodyPr vert="horz" lIns="91440" tIns="45720" rIns="91440" bIns="45720" rtlCol="0" anchor="ctr"/>
+          <a:lstStyle/>
+          <a:p>
             <a:fld id="{3A98EE3D-8CD1-4C3F-BD1C-C98C9596463C}" type="slidenum">
-              <a:rPr lang="fr-FR" noProof="0" smtClean="0">
+              <a:rPr lang="fr-FR" sz="3200" b="1">
                 <a:latin typeface="Calibri" panose="020F0502020204030204" pitchFamily="34" charset="0"/>
                 <a:ea typeface="Calibri" panose="020F0502020204030204" pitchFamily="34" charset="0"/>
                 <a:cs typeface="Calibri" panose="020F0502020204030204" pitchFamily="34" charset="0"/>
               </a:rPr>
+              <a:pPr/>
               <a:t>7</a:t>
             </a:fld>
-            <a:endParaRPr lang="fr-FR" noProof="0" dirty="0">
+            <a:endParaRPr lang="fr-FR" sz="3200" b="1" dirty="0">
               <a:latin typeface="Calibri" panose="020F0502020204030204" pitchFamily="34" charset="0"/>
               <a:ea typeface="Calibri" panose="020F0502020204030204" pitchFamily="34" charset="0"/>
               <a:cs typeface="Calibri" panose="020F0502020204030204" pitchFamily="34" charset="0"/>
@@ -21649,19 +21795,19 @@
         </p:nvSpPr>
         <p:spPr/>
         <p:txBody>
-          <a:bodyPr/>
-          <a:lstStyle/>
-          <a:p>
-            <a:pPr rtl="0"/>
+          <a:bodyPr vert="horz" lIns="91440" tIns="45720" rIns="91440" bIns="45720" rtlCol="0" anchor="ctr"/>
+          <a:lstStyle/>
+          <a:p>
             <a:fld id="{3A98EE3D-8CD1-4C3F-BD1C-C98C9596463C}" type="slidenum">
-              <a:rPr lang="fr-FR" noProof="0" smtClean="0">
+              <a:rPr lang="fr-FR" sz="3200" b="1">
                 <a:latin typeface="Calibri" panose="020F0502020204030204" pitchFamily="34" charset="0"/>
                 <a:ea typeface="Calibri" panose="020F0502020204030204" pitchFamily="34" charset="0"/>
                 <a:cs typeface="Calibri" panose="020F0502020204030204" pitchFamily="34" charset="0"/>
               </a:rPr>
+              <a:pPr/>
               <a:t>8</a:t>
             </a:fld>
-            <a:endParaRPr lang="fr-FR" noProof="0" dirty="0">
+            <a:endParaRPr lang="fr-FR" sz="3200" b="1" dirty="0">
               <a:latin typeface="Calibri" panose="020F0502020204030204" pitchFamily="34" charset="0"/>
               <a:ea typeface="Calibri" panose="020F0502020204030204" pitchFamily="34" charset="0"/>
               <a:cs typeface="Calibri" panose="020F0502020204030204" pitchFamily="34" charset="0"/>
@@ -22372,19 +22518,19 @@
         </p:nvSpPr>
         <p:spPr/>
         <p:txBody>
-          <a:bodyPr/>
-          <a:lstStyle/>
-          <a:p>
-            <a:pPr rtl="0"/>
+          <a:bodyPr vert="horz" lIns="91440" tIns="45720" rIns="91440" bIns="45720" rtlCol="0" anchor="ctr"/>
+          <a:lstStyle/>
+          <a:p>
             <a:fld id="{3A98EE3D-8CD1-4C3F-BD1C-C98C9596463C}" type="slidenum">
-              <a:rPr lang="fr-FR" noProof="0" smtClean="0">
+              <a:rPr lang="fr-FR" sz="3200" b="1">
                 <a:latin typeface="Calibri" panose="020F0502020204030204" pitchFamily="34" charset="0"/>
                 <a:ea typeface="Calibri" panose="020F0502020204030204" pitchFamily="34" charset="0"/>
                 <a:cs typeface="Calibri" panose="020F0502020204030204" pitchFamily="34" charset="0"/>
               </a:rPr>
+              <a:pPr/>
               <a:t>9</a:t>
             </a:fld>
-            <a:endParaRPr lang="fr-FR" noProof="0" dirty="0">
+            <a:endParaRPr lang="fr-FR" sz="3200" b="1" dirty="0">
               <a:latin typeface="Calibri" panose="020F0502020204030204" pitchFamily="34" charset="0"/>
               <a:ea typeface="Calibri" panose="020F0502020204030204" pitchFamily="34" charset="0"/>
               <a:cs typeface="Calibri" panose="020F0502020204030204" pitchFamily="34" charset="0"/>

</xml_diff>